<commit_message>
Edit Exercise and slides 06
</commit_message>
<xml_diff>
--- a/Slides/Slides-06-Modes_of_Validation/Slides-06-Modes_of_Validation.pptx
+++ b/Slides/Slides-06-Modes_of_Validation/Slides-06-Modes_of_Validation.pptx
@@ -5,7 +5,7 @@
     <p:sldMasterId id="2147483673" r:id="rId4"/>
   </p:sldMasterIdLst>
   <p:notesMasterIdLst>
-    <p:notesMasterId r:id="rId18"/>
+    <p:notesMasterId r:id="rId19"/>
   </p:notesMasterIdLst>
   <p:sldIdLst>
     <p:sldId id="257" r:id="rId5"/>
@@ -14,13 +14,14 @@
     <p:sldId id="403" r:id="rId8"/>
     <p:sldId id="333" r:id="rId9"/>
     <p:sldId id="381" r:id="rId10"/>
-    <p:sldId id="398" r:id="rId11"/>
-    <p:sldId id="399" r:id="rId12"/>
-    <p:sldId id="400" r:id="rId13"/>
-    <p:sldId id="401" r:id="rId14"/>
-    <p:sldId id="396" r:id="rId15"/>
-    <p:sldId id="397" r:id="rId16"/>
-    <p:sldId id="330" r:id="rId17"/>
+    <p:sldId id="396" r:id="rId11"/>
+    <p:sldId id="397" r:id="rId12"/>
+    <p:sldId id="398" r:id="rId13"/>
+    <p:sldId id="399" r:id="rId14"/>
+    <p:sldId id="400" r:id="rId15"/>
+    <p:sldId id="401" r:id="rId16"/>
+    <p:sldId id="404" r:id="rId17"/>
+    <p:sldId id="330" r:id="rId18"/>
   </p:sldIdLst>
   <p:sldSz cx="12192000" cy="6858000"/>
   <p:notesSz cx="6858000" cy="9144000"/>
@@ -121,7 +122,7 @@
   </p:defaultTextStyle>
   <p:extLst>
     <p:ext uri="{EFAFB233-063F-42B5-8137-9DF3F51BA10A}">
-      <p15:sldGuideLst xmlns:p15="http://schemas.microsoft.com/office/powerpoint/2012/main"/>
+      <p15:sldGuideLst xmlns:p15="http://schemas.microsoft.com/office/powerpoint/2012/main" xmlns=""/>
     </p:ext>
   </p:extLst>
 </p:presentation>
@@ -130,11 +131,7 @@
 <file path=ppt/commentAuthors.xml><?xml version="1.0" encoding="utf-8"?>
 <p:cmAuthorLst xmlns:a="http://schemas.openxmlformats.org/drawingml/2006/main" xmlns:r="http://schemas.openxmlformats.org/officeDocument/2006/relationships" xmlns:p="http://schemas.openxmlformats.org/presentationml/2006/main">
   <p:cmAuthor id="1" name="Hughes, Ellis H" initials="HEH" lastIdx="1" clrIdx="0">
-    <p:extLst>
-      <p:ext uri="{19B8F6BF-5375-455C-9EA6-DF929625EA0E}">
-        <p15:presenceInfo xmlns:p15="http://schemas.microsoft.com/office/powerpoint/2012/main" userId="S::ehhughes@fredhutch.org::460c8e57-1da4-4dc7-bbf9-89eda83558c6" providerId="AD"/>
-      </p:ext>
-    </p:extLst>
+    <p:extLst/>
   </p:cmAuthor>
 </p:cmAuthorLst>
 </file>
@@ -221,7 +218,7 @@
           <a:p>
             <a:fld id="{AE1375EF-7AC2-40F0-8984-3657FAAC21B8}" type="datetimeFigureOut">
               <a:rPr lang="en-US" smtClean="0"/>
-              <a:t>6/3/2021</a:t>
+              <a:t>9/10/2021</a:t>
             </a:fld>
             <a:endParaRPr lang="en-US"/>
           </a:p>
@@ -663,7 +660,7 @@
     </p:spTree>
     <p:extLst>
       <p:ext uri="{BB962C8B-B14F-4D97-AF65-F5344CB8AC3E}">
-        <p14:creationId xmlns:p14="http://schemas.microsoft.com/office/powerpoint/2010/main" val="3932331884"/>
+        <p14:creationId xmlns:p14="http://schemas.microsoft.com/office/powerpoint/2010/main" val="2939605408"/>
       </p:ext>
     </p:extLst>
   </p:cSld>
@@ -747,7 +744,7 @@
     </p:spTree>
     <p:extLst>
       <p:ext uri="{BB962C8B-B14F-4D97-AF65-F5344CB8AC3E}">
-        <p14:creationId xmlns:p14="http://schemas.microsoft.com/office/powerpoint/2010/main" val="688421938"/>
+        <p14:creationId xmlns:p14="http://schemas.microsoft.com/office/powerpoint/2010/main" val="1607404113"/>
       </p:ext>
     </p:extLst>
   </p:cSld>
@@ -818,10 +815,6 @@
               <a:tabLst/>
               <a:defRPr/>
             </a:pPr>
-            <a:r>
-              <a:rPr lang="en-US"/>
-              <a:t>https://r-pkgs.org/package-structure-state.html#bundled-package</a:t>
-            </a:r>
             <a:endParaRPr lang="en-US" dirty="0"/>
           </a:p>
         </p:txBody>
@@ -852,7 +845,7 @@
     </p:spTree>
     <p:extLst>
       <p:ext uri="{BB962C8B-B14F-4D97-AF65-F5344CB8AC3E}">
-        <p14:creationId xmlns:p14="http://schemas.microsoft.com/office/powerpoint/2010/main" val="3736204489"/>
+        <p14:creationId xmlns:p14="http://schemas.microsoft.com/office/powerpoint/2010/main" val="3932331884"/>
       </p:ext>
     </p:extLst>
   </p:cSld>
@@ -906,6 +899,23 @@
           <a:bodyPr/>
           <a:lstStyle/>
           <a:p>
+            <a:pPr marL="0" marR="0" lvl="0" indent="0" algn="l" defTabSz="914400" rtl="0" eaLnBrk="1" fontAlgn="auto" latinLnBrk="0" hangingPunct="1">
+              <a:lnSpc>
+                <a:spcPct val="100000"/>
+              </a:lnSpc>
+              <a:spcBef>
+                <a:spcPts val="0"/>
+              </a:spcBef>
+              <a:spcAft>
+                <a:spcPts val="0"/>
+              </a:spcAft>
+              <a:buClrTx/>
+              <a:buSzTx/>
+              <a:buFontTx/>
+              <a:buNone/>
+              <a:tabLst/>
+              <a:defRPr/>
+            </a:pPr>
             <a:endParaRPr lang="en-US" dirty="0"/>
           </a:p>
         </p:txBody>
@@ -928,6 +938,90 @@
             <a:fld id="{B9F26414-4BE6-427A-9F34-1430B41B92D6}" type="slidenum">
               <a:rPr lang="en-US" smtClean="0"/>
               <a:t>13</a:t>
+            </a:fld>
+            <a:endParaRPr lang="en-US"/>
+          </a:p>
+        </p:txBody>
+      </p:sp>
+    </p:spTree>
+    <p:extLst>
+      <p:ext uri="{BB962C8B-B14F-4D97-AF65-F5344CB8AC3E}">
+        <p14:creationId xmlns:p14="http://schemas.microsoft.com/office/powerpoint/2010/main" val="3736204489"/>
+      </p:ext>
+    </p:extLst>
+  </p:cSld>
+  <p:clrMapOvr>
+    <a:masterClrMapping/>
+  </p:clrMapOvr>
+</p:notes>
+</file>
+
+<file path=ppt/notesSlides/notesSlide14.xml><?xml version="1.0" encoding="utf-8"?>
+<p:notes xmlns:a="http://schemas.openxmlformats.org/drawingml/2006/main" xmlns:r="http://schemas.openxmlformats.org/officeDocument/2006/relationships" xmlns:p="http://schemas.openxmlformats.org/presentationml/2006/main">
+  <p:cSld>
+    <p:spTree>
+      <p:nvGrpSpPr>
+        <p:cNvPr id="1" name=""/>
+        <p:cNvGrpSpPr/>
+        <p:nvPr/>
+      </p:nvGrpSpPr>
+      <p:grpSpPr>
+        <a:xfrm>
+          <a:off x="0" y="0"/>
+          <a:ext cx="0" cy="0"/>
+          <a:chOff x="0" y="0"/>
+          <a:chExt cx="0" cy="0"/>
+        </a:xfrm>
+      </p:grpSpPr>
+      <p:sp>
+        <p:nvSpPr>
+          <p:cNvPr id="2" name="Slide Image Placeholder 1"/>
+          <p:cNvSpPr>
+            <a:spLocks noGrp="1" noRot="1" noChangeAspect="1"/>
+          </p:cNvSpPr>
+          <p:nvPr>
+            <p:ph type="sldImg"/>
+          </p:nvPr>
+        </p:nvSpPr>
+        <p:spPr/>
+      </p:sp>
+      <p:sp>
+        <p:nvSpPr>
+          <p:cNvPr id="3" name="Notes Placeholder 2"/>
+          <p:cNvSpPr>
+            <a:spLocks noGrp="1"/>
+          </p:cNvSpPr>
+          <p:nvPr>
+            <p:ph type="body" idx="1"/>
+          </p:nvPr>
+        </p:nvSpPr>
+        <p:spPr/>
+        <p:txBody>
+          <a:bodyPr/>
+          <a:lstStyle/>
+          <a:p>
+            <a:endParaRPr lang="en-US" dirty="0"/>
+          </a:p>
+        </p:txBody>
+      </p:sp>
+      <p:sp>
+        <p:nvSpPr>
+          <p:cNvPr id="4" name="Slide Number Placeholder 3"/>
+          <p:cNvSpPr>
+            <a:spLocks noGrp="1"/>
+          </p:cNvSpPr>
+          <p:nvPr>
+            <p:ph type="sldNum" sz="quarter" idx="5"/>
+          </p:nvPr>
+        </p:nvSpPr>
+        <p:spPr/>
+        <p:txBody>
+          <a:bodyPr/>
+          <a:lstStyle/>
+          <a:p>
+            <a:fld id="{B9F26414-4BE6-427A-9F34-1430B41B92D6}" type="slidenum">
+              <a:rPr lang="en-US" smtClean="0"/>
+              <a:t>14</a:t>
             </a:fld>
             <a:endParaRPr lang="en-US"/>
           </a:p>
@@ -1540,7 +1634,7 @@
     </p:spTree>
     <p:extLst>
       <p:ext uri="{BB962C8B-B14F-4D97-AF65-F5344CB8AC3E}">
-        <p14:creationId xmlns:p14="http://schemas.microsoft.com/office/powerpoint/2010/main" val="3993840853"/>
+        <p14:creationId xmlns:p14="http://schemas.microsoft.com/office/powerpoint/2010/main" val="688421938"/>
       </p:ext>
     </p:extLst>
   </p:cSld>
@@ -1611,6 +1705,10 @@
               <a:tabLst/>
               <a:defRPr/>
             </a:pPr>
+            <a:r>
+              <a:rPr lang="en-US"/>
+              <a:t>https://r-pkgs.org/package-structure-state.html#bundled-package</a:t>
+            </a:r>
             <a:endParaRPr lang="en-US" dirty="0"/>
           </a:p>
         </p:txBody>
@@ -1641,7 +1739,7 @@
     </p:spTree>
     <p:extLst>
       <p:ext uri="{BB962C8B-B14F-4D97-AF65-F5344CB8AC3E}">
-        <p14:creationId xmlns:p14="http://schemas.microsoft.com/office/powerpoint/2010/main" val="2939605408"/>
+        <p14:creationId xmlns:p14="http://schemas.microsoft.com/office/powerpoint/2010/main" val="3736204489"/>
       </p:ext>
     </p:extLst>
   </p:cSld>
@@ -1725,7 +1823,7 @@
     </p:spTree>
     <p:extLst>
       <p:ext uri="{BB962C8B-B14F-4D97-AF65-F5344CB8AC3E}">
-        <p14:creationId xmlns:p14="http://schemas.microsoft.com/office/powerpoint/2010/main" val="1607404113"/>
+        <p14:creationId xmlns:p14="http://schemas.microsoft.com/office/powerpoint/2010/main" val="3993840853"/>
       </p:ext>
     </p:extLst>
   </p:cSld>
@@ -1757,7 +1855,7 @@
           <p:cNvPr id="5" name="Rectangle 4">
             <a:extLst>
               <a:ext uri="{FF2B5EF4-FFF2-40B4-BE49-F238E27FC236}">
-                <a16:creationId xmlns:a16="http://schemas.microsoft.com/office/drawing/2014/main" id="{904DB13E-F722-4ED6-BB00-556651E95281}"/>
+                <a16:creationId xmlns:a16="http://schemas.microsoft.com/office/drawing/2014/main" xmlns="" id="{904DB13E-F722-4ED6-BB00-556651E95281}"/>
               </a:ext>
             </a:extLst>
           </p:cNvPr>
@@ -1906,7 +2004,7 @@
           <p:cNvPr id="7" name="Group 6">
             <a:extLst>
               <a:ext uri="{FF2B5EF4-FFF2-40B4-BE49-F238E27FC236}">
-                <a16:creationId xmlns:a16="http://schemas.microsoft.com/office/drawing/2014/main" id="{E26428D7-C6F3-473D-A360-A3F5C3E8728C}"/>
+                <a16:creationId xmlns:a16="http://schemas.microsoft.com/office/drawing/2014/main" xmlns="" id="{E26428D7-C6F3-473D-A360-A3F5C3E8728C}"/>
               </a:ext>
             </a:extLst>
           </p:cNvPr>
@@ -2204,7 +2302,7 @@
           <a:p>
             <a:fld id="{EA0C0817-A112-4847-8014-A94B7D2A4EA3}" type="datetime1">
               <a:rPr lang="en-US" smtClean="0"/>
-              <a:t>6/3/2021</a:t>
+              <a:t>9/10/2021</a:t>
             </a:fld>
             <a:endParaRPr lang="en-US" dirty="0"/>
           </a:p>
@@ -2406,7 +2504,7 @@
           <a:p>
             <a:fld id="{7332B432-ACDA-4023-A761-2BAB76577B62}" type="datetime1">
               <a:rPr lang="en-US" smtClean="0"/>
-              <a:t>6/3/2021</a:t>
+              <a:t>9/10/2021</a:t>
             </a:fld>
             <a:endParaRPr lang="en-US" dirty="0"/>
           </a:p>
@@ -2489,7 +2587,7 @@
           <p:cNvPr id="15" name="Rectangle 14">
             <a:extLst>
               <a:ext uri="{FF2B5EF4-FFF2-40B4-BE49-F238E27FC236}">
-                <a16:creationId xmlns:a16="http://schemas.microsoft.com/office/drawing/2014/main" id="{0A4A1889-E37C-4EC3-9E41-9DAD221CF389}"/>
+                <a16:creationId xmlns:a16="http://schemas.microsoft.com/office/drawing/2014/main" xmlns="" id="{0A4A1889-E37C-4EC3-9E41-9DAD221CF389}"/>
               </a:ext>
             </a:extLst>
           </p:cNvPr>
@@ -2686,7 +2784,7 @@
           <p:cNvPr id="16" name="Group 15">
             <a:extLst>
               <a:ext uri="{FF2B5EF4-FFF2-40B4-BE49-F238E27FC236}">
-                <a16:creationId xmlns:a16="http://schemas.microsoft.com/office/drawing/2014/main" id="{1683EB04-C23E-490C-A1A6-030CF79D23C8}"/>
+                <a16:creationId xmlns:a16="http://schemas.microsoft.com/office/drawing/2014/main" xmlns="" id="{1683EB04-C23E-490C-A1A6-030CF79D23C8}"/>
               </a:ext>
             </a:extLst>
           </p:cNvPr>
@@ -2706,7 +2804,7 @@
             <p:cNvPr id="17" name="Straight Connector 16">
               <a:extLst>
                 <a:ext uri="{FF2B5EF4-FFF2-40B4-BE49-F238E27FC236}">
-                  <a16:creationId xmlns:a16="http://schemas.microsoft.com/office/drawing/2014/main" id="{F8A84C03-E1CA-4A4E-81D6-9BB0C335B7A0}"/>
+                  <a16:creationId xmlns:a16="http://schemas.microsoft.com/office/drawing/2014/main" xmlns="" id="{F8A84C03-E1CA-4A4E-81D6-9BB0C335B7A0}"/>
                 </a:ext>
               </a:extLst>
             </p:cNvPr>
@@ -2754,7 +2852,7 @@
             <p:cNvPr id="18" name="Straight Connector 17">
               <a:extLst>
                 <a:ext uri="{FF2B5EF4-FFF2-40B4-BE49-F238E27FC236}">
-                  <a16:creationId xmlns:a16="http://schemas.microsoft.com/office/drawing/2014/main" id="{4A26FB5A-D5D1-4DAB-AC43-7F51A7F2D197}"/>
+                  <a16:creationId xmlns:a16="http://schemas.microsoft.com/office/drawing/2014/main" xmlns="" id="{4A26FB5A-D5D1-4DAB-AC43-7F51A7F2D197}"/>
                 </a:ext>
               </a:extLst>
             </p:cNvPr>
@@ -2802,7 +2900,7 @@
             <p:cNvPr id="19" name="Straight Connector 18">
               <a:extLst>
                 <a:ext uri="{FF2B5EF4-FFF2-40B4-BE49-F238E27FC236}">
-                  <a16:creationId xmlns:a16="http://schemas.microsoft.com/office/drawing/2014/main" id="{49303F14-E560-4C02-94F4-B4695FE26813}"/>
+                  <a16:creationId xmlns:a16="http://schemas.microsoft.com/office/drawing/2014/main" xmlns="" id="{49303F14-E560-4C02-94F4-B4695FE26813}"/>
                 </a:ext>
               </a:extLst>
             </p:cNvPr>
@@ -3005,7 +3103,7 @@
           <a:p>
             <a:fld id="{D9C646AA-F36E-4540-911D-FFFC0A0EF24A}" type="datetime1">
               <a:rPr lang="en-US" smtClean="0"/>
-              <a:t>6/3/2021</a:t>
+              <a:t>9/10/2021</a:t>
             </a:fld>
             <a:endParaRPr lang="en-US" dirty="0"/>
           </a:p>
@@ -3325,7 +3423,7 @@
           <a:p>
             <a:fld id="{69186D26-FA5F-4637-B602-B7C2DC34CFD4}" type="datetime1">
               <a:rPr lang="en-US" smtClean="0"/>
-              <a:t>6/3/2021</a:t>
+              <a:t>9/10/2021</a:t>
             </a:fld>
             <a:endParaRPr lang="en-US" dirty="0"/>
           </a:p>
@@ -3762,7 +3860,7 @@
           <a:p>
             <a:fld id="{8A7F15D8-96D1-4781-BC50-CA8A088B2FE4}" type="datetime1">
               <a:rPr lang="en-US" smtClean="0"/>
-              <a:t>6/3/2021</a:t>
+              <a:t>9/10/2021</a:t>
             </a:fld>
             <a:endParaRPr lang="en-US" dirty="0"/>
           </a:p>
@@ -3880,7 +3978,7 @@
           <a:p>
             <a:fld id="{F9A96C99-B8F8-4528-BD05-0E16E943DC09}" type="datetime1">
               <a:rPr lang="en-US" smtClean="0"/>
-              <a:t>6/3/2021</a:t>
+              <a:t>9/10/2021</a:t>
             </a:fld>
             <a:endParaRPr lang="en-US" dirty="0"/>
           </a:p>
@@ -3975,7 +4073,7 @@
           <a:p>
             <a:fld id="{03636942-C211-4B28-8DBD-C953E00AF71B}" type="datetime1">
               <a:rPr lang="en-US" smtClean="0"/>
-              <a:t>6/3/2021</a:t>
+              <a:t>9/10/2021</a:t>
             </a:fld>
             <a:endParaRPr lang="en-US" dirty="0"/>
           </a:p>
@@ -4058,7 +4156,7 @@
           <p:cNvPr id="10" name="Rectangle 9">
             <a:extLst>
               <a:ext uri="{FF2B5EF4-FFF2-40B4-BE49-F238E27FC236}">
-                <a16:creationId xmlns:a16="http://schemas.microsoft.com/office/drawing/2014/main" id="{D5E1BBF9-8BEF-4353-BA68-30AAF9EBD8D8}"/>
+                <a16:creationId xmlns:a16="http://schemas.microsoft.com/office/drawing/2014/main" xmlns="" id="{D5E1BBF9-8BEF-4353-BA68-30AAF9EBD8D8}"/>
               </a:ext>
             </a:extLst>
           </p:cNvPr>
@@ -4105,7 +4203,7 @@
           <p:cNvPr id="13" name="Rectangle 12">
             <a:extLst>
               <a:ext uri="{FF2B5EF4-FFF2-40B4-BE49-F238E27FC236}">
-                <a16:creationId xmlns:a16="http://schemas.microsoft.com/office/drawing/2014/main" id="{5B941C21-2A5D-4912-AB06-1BB0C0EB6AE1}"/>
+                <a16:creationId xmlns:a16="http://schemas.microsoft.com/office/drawing/2014/main" xmlns="" id="{5B941C21-2A5D-4912-AB06-1BB0C0EB6AE1}"/>
               </a:ext>
             </a:extLst>
           </p:cNvPr>
@@ -4392,7 +4490,7 @@
           <a:p>
             <a:fld id="{7E8D12A6-918A-48BD-8CB9-CA713993B0EA}" type="datetime1">
               <a:rPr lang="en-US" smtClean="0"/>
-              <a:t>6/3/2021</a:t>
+              <a:t>9/10/2021</a:t>
             </a:fld>
             <a:endParaRPr lang="en-US" dirty="0"/>
           </a:p>
@@ -4500,7 +4598,7 @@
           <p:cNvPr id="11" name="Rectangle 10">
             <a:extLst>
               <a:ext uri="{FF2B5EF4-FFF2-40B4-BE49-F238E27FC236}">
-                <a16:creationId xmlns:a16="http://schemas.microsoft.com/office/drawing/2014/main" id="{E687CA98-D9C7-497F-A1DA-7D22F8753BCE}"/>
+                <a16:creationId xmlns:a16="http://schemas.microsoft.com/office/drawing/2014/main" xmlns="" id="{E687CA98-D9C7-497F-A1DA-7D22F8753BCE}"/>
               </a:ext>
             </a:extLst>
           </p:cNvPr>
@@ -4654,7 +4752,7 @@
             <a:fld id="{E778CE86-875F-4587-BCF6-FA054AFC0D53}" type="datetime1">
               <a:rPr lang="en-US" smtClean="0"/>
               <a:pPr/>
-              <a:t>6/3/2021</a:t>
+              <a:t>9/10/2021</a:t>
             </a:fld>
             <a:endParaRPr lang="en-US" dirty="0"/>
           </a:p>
@@ -4736,7 +4834,7 @@
           <p:cNvPr id="12" name="Rectangle 11">
             <a:extLst>
               <a:ext uri="{FF2B5EF4-FFF2-40B4-BE49-F238E27FC236}">
-                <a16:creationId xmlns:a16="http://schemas.microsoft.com/office/drawing/2014/main" id="{F8B3D8CC-BB13-41A5-8F34-B8E84A4F9534}"/>
+                <a16:creationId xmlns:a16="http://schemas.microsoft.com/office/drawing/2014/main" xmlns="" id="{F8B3D8CC-BB13-41A5-8F34-B8E84A4F9534}"/>
               </a:ext>
             </a:extLst>
           </p:cNvPr>
@@ -4938,7 +5036,7 @@
           <p:cNvPr id="9" name="Rectangle 8">
             <a:extLst>
               <a:ext uri="{FF2B5EF4-FFF2-40B4-BE49-F238E27FC236}">
-                <a16:creationId xmlns:a16="http://schemas.microsoft.com/office/drawing/2014/main" id="{1E94681D-2A4C-4A8D-B9B5-31D440D0328D}"/>
+                <a16:creationId xmlns:a16="http://schemas.microsoft.com/office/drawing/2014/main" xmlns="" id="{1E94681D-2A4C-4A8D-B9B5-31D440D0328D}"/>
               </a:ext>
             </a:extLst>
           </p:cNvPr>
@@ -5170,7 +5268,7 @@
           <a:p>
             <a:fld id="{F6FA2B21-3FCD-4721-B95C-427943F61125}" type="datetime1">
               <a:rPr lang="en-US" smtClean="0"/>
-              <a:t>6/3/2021</a:t>
+              <a:t>9/10/2021</a:t>
             </a:fld>
             <a:endParaRPr lang="en-US" dirty="0"/>
           </a:p>
@@ -5650,7 +5748,7 @@
           <p:cNvPr id="6" name="Picture 5" descr="abstract image">
             <a:extLst>
               <a:ext uri="{FF2B5EF4-FFF2-40B4-BE49-F238E27FC236}">
-                <a16:creationId xmlns:a16="http://schemas.microsoft.com/office/drawing/2014/main" id="{8045422F-7258-40AC-BD2E-2469AA448922}"/>
+                <a16:creationId xmlns:a16="http://schemas.microsoft.com/office/drawing/2014/main" xmlns="" id="{8045422F-7258-40AC-BD2E-2469AA448922}"/>
               </a:ext>
             </a:extLst>
           </p:cNvPr>
@@ -5685,10 +5783,10 @@
           <p:cNvPr id="82" name="Rectangle 81">
             <a:extLst>
               <a:ext uri="{FF2B5EF4-FFF2-40B4-BE49-F238E27FC236}">
-                <a16:creationId xmlns:a16="http://schemas.microsoft.com/office/drawing/2014/main" id="{2644B391-9BFE-445C-A9EC-F544BB85FBC7}"/>
+                <a16:creationId xmlns:a16="http://schemas.microsoft.com/office/drawing/2014/main" xmlns="" id="{2644B391-9BFE-445C-A9EC-F544BB85FBC7}"/>
               </a:ext>
               <a:ext uri="{C183D7F6-B498-43B3-948B-1728B52AA6E4}">
-                <adec:decorative xmlns:adec="http://schemas.microsoft.com/office/drawing/2017/decorative" val="1"/>
+                <adec:decorative xmlns:adec="http://schemas.microsoft.com/office/drawing/2017/decorative" xmlns="" val="1"/>
               </a:ext>
             </a:extLst>
           </p:cNvPr>
@@ -5698,7 +5796,7 @@
           <p:nvPr>
             <p:extLst>
               <p:ext uri="{386F3935-93C4-4BCD-93E2-E3B085C9AB24}">
-                <p16:designElem xmlns:p16="http://schemas.microsoft.com/office/powerpoint/2015/main" val="1"/>
+                <p16:designElem xmlns:p16="http://schemas.microsoft.com/office/powerpoint/2015/main" xmlns="" val="1"/>
               </p:ext>
             </p:extLst>
           </p:nvPr>
@@ -5730,10 +5828,10 @@
           <p:cNvPr id="84" name="Rectangle 83">
             <a:extLst>
               <a:ext uri="{FF2B5EF4-FFF2-40B4-BE49-F238E27FC236}">
-                <a16:creationId xmlns:a16="http://schemas.microsoft.com/office/drawing/2014/main" id="{80F26E69-87D9-4655-AE7B-280A87AA3CAD}"/>
+                <a16:creationId xmlns:a16="http://schemas.microsoft.com/office/drawing/2014/main" xmlns="" id="{80F26E69-87D9-4655-AE7B-280A87AA3CAD}"/>
               </a:ext>
               <a:ext uri="{C183D7F6-B498-43B3-948B-1728B52AA6E4}">
-                <adec:decorative xmlns:adec="http://schemas.microsoft.com/office/drawing/2017/decorative" val="1"/>
+                <adec:decorative xmlns:adec="http://schemas.microsoft.com/office/drawing/2017/decorative" xmlns="" val="1"/>
               </a:ext>
             </a:extLst>
           </p:cNvPr>
@@ -5743,7 +5841,7 @@
           <p:nvPr>
             <p:extLst>
               <p:ext uri="{386F3935-93C4-4BCD-93E2-E3B085C9AB24}">
-                <p16:designElem xmlns:p16="http://schemas.microsoft.com/office/powerpoint/2015/main" val="1"/>
+                <p16:designElem xmlns:p16="http://schemas.microsoft.com/office/powerpoint/2015/main" xmlns="" val="1"/>
               </p:ext>
             </p:extLst>
           </p:nvPr>
@@ -5774,7 +5872,7 @@
           <p:cNvPr id="2" name="Title 1">
             <a:extLst>
               <a:ext uri="{FF2B5EF4-FFF2-40B4-BE49-F238E27FC236}">
-                <a16:creationId xmlns:a16="http://schemas.microsoft.com/office/drawing/2014/main" id="{18C3B467-088C-4F3D-A9A7-105C4E1E20CD}"/>
+                <a16:creationId xmlns:a16="http://schemas.microsoft.com/office/drawing/2014/main" xmlns="" id="{18C3B467-088C-4F3D-A9A7-105C4E1E20CD}"/>
               </a:ext>
             </a:extLst>
           </p:cNvPr>
@@ -5813,7 +5911,7 @@
           <p:cNvPr id="3" name="Subtitle 2">
             <a:extLst>
               <a:ext uri="{FF2B5EF4-FFF2-40B4-BE49-F238E27FC236}">
-                <a16:creationId xmlns:a16="http://schemas.microsoft.com/office/drawing/2014/main" id="{C8722DDC-8EEE-4A06-8DFE-B44871EAA2CF}"/>
+                <a16:creationId xmlns:a16="http://schemas.microsoft.com/office/drawing/2014/main" xmlns="" id="{C8722DDC-8EEE-4A06-8DFE-B44871EAA2CF}"/>
               </a:ext>
             </a:extLst>
           </p:cNvPr>
@@ -5857,7 +5955,7 @@
           <p:cNvPr id="5" name="Straight Connector 4">
             <a:extLst>
               <a:ext uri="{FF2B5EF4-FFF2-40B4-BE49-F238E27FC236}">
-                <a16:creationId xmlns:a16="http://schemas.microsoft.com/office/drawing/2014/main" id="{20AC4B09-ED72-42FC-9845-45FC1F4BC29D}"/>
+                <a16:creationId xmlns:a16="http://schemas.microsoft.com/office/drawing/2014/main" xmlns="" id="{20AC4B09-ED72-42FC-9845-45FC1F4BC29D}"/>
               </a:ext>
             </a:extLst>
           </p:cNvPr>
@@ -5928,7 +6026,7 @@
           <p:cNvPr id="8" name="Title 7">
             <a:extLst>
               <a:ext uri="{FF2B5EF4-FFF2-40B4-BE49-F238E27FC236}">
-                <a16:creationId xmlns:a16="http://schemas.microsoft.com/office/drawing/2014/main" id="{6A34AC25-F9D4-48D7-A664-C590D06BF559}"/>
+                <a16:creationId xmlns:a16="http://schemas.microsoft.com/office/drawing/2014/main" xmlns="" id="{6A34AC25-F9D4-48D7-A664-C590D06BF559}"/>
               </a:ext>
             </a:extLst>
           </p:cNvPr>
@@ -5946,7 +6044,7 @@
           <a:p>
             <a:r>
               <a:rPr lang="en-US" dirty="0" err="1"/>
-              <a:t>vt_validate_installed_package</a:t>
+              <a:t>vt_validate_install</a:t>
             </a:r>
             <a:r>
               <a:rPr lang="en-US" dirty="0"/>
@@ -5960,7 +6058,7 @@
           <p:cNvPr id="5" name="TextBox 4">
             <a:extLst>
               <a:ext uri="{FF2B5EF4-FFF2-40B4-BE49-F238E27FC236}">
-                <a16:creationId xmlns:a16="http://schemas.microsoft.com/office/drawing/2014/main" id="{EF5BA94D-0FB3-4C60-9994-8A309B690D97}"/>
+                <a16:creationId xmlns:a16="http://schemas.microsoft.com/office/drawing/2014/main" xmlns="" id="{EF5BA94D-0FB3-4C60-9994-8A309B690D97}"/>
               </a:ext>
             </a:extLst>
           </p:cNvPr>
@@ -5969,8 +6067,8 @@
         </p:nvSpPr>
         <p:spPr>
           <a:xfrm>
-            <a:off x="1253479" y="1694160"/>
-            <a:ext cx="10321487" cy="5262979"/>
+            <a:off x="1609494" y="2296326"/>
+            <a:ext cx="9630936" cy="4154984"/>
           </a:xfrm>
           <a:prstGeom prst="rect">
             <a:avLst/>
@@ -5988,32 +6086,8 @@
               <a:buChar char="•"/>
             </a:pPr>
             <a:r>
-              <a:rPr lang="en-US" sz="2800" dirty="0"/>
-              <a:t>ONLY works for packages installed via `</a:t>
-            </a:r>
-            <a:r>
-              <a:rPr lang="en-US" sz="2800" dirty="0" err="1"/>
-              <a:t>vt_validate_install</a:t>
-            </a:r>
-            <a:r>
-              <a:rPr lang="en-US" sz="2800" dirty="0"/>
-              <a:t>()` or installed from </a:t>
-            </a:r>
-            <a:r>
-              <a:rPr lang="en-US" sz="2800" dirty="0" err="1"/>
-              <a:t>tarball</a:t>
-            </a:r>
-            <a:r>
-              <a:rPr lang="en-US" sz="2800" dirty="0"/>
-              <a:t> created by `</a:t>
-            </a:r>
-            <a:r>
-              <a:rPr lang="en-US" sz="2800" dirty="0" err="1"/>
-              <a:t>vt_validate_build</a:t>
-            </a:r>
-            <a:r>
-              <a:rPr lang="en-US" sz="2800" dirty="0"/>
-              <a:t>()`</a:t>
+              <a:rPr lang="en-US" sz="2400" dirty="0"/>
+              <a:t>Temporarily installs the package and executes the validation Rmd</a:t>
             </a:r>
           </a:p>
           <a:p>
@@ -6021,7 +6095,18 @@
               <a:buFont typeface="Arial" panose="020B0604020202020204" pitchFamily="34" charset="0"/>
               <a:buChar char="•"/>
             </a:pPr>
-            <a:endParaRPr lang="en-US" sz="2800" dirty="0"/>
+            <a:r>
+              <a:rPr lang="en-US" sz="2400" dirty="0"/>
+              <a:t>Copies contents into “output” directory – </a:t>
+            </a:r>
+            <a:r>
+              <a:rPr lang="en-US" sz="2400" dirty="0" err="1"/>
+              <a:t>inst</a:t>
+            </a:r>
+            <a:r>
+              <a:rPr lang="en-US" sz="2400" dirty="0"/>
+              <a:t>/validation</a:t>
+            </a:r>
           </a:p>
           <a:p>
             <a:pPr marL="285750" indent="-285750">
@@ -6029,24 +6114,39 @@
               <a:buChar char="•"/>
             </a:pPr>
             <a:r>
-              <a:rPr lang="en-US" sz="2800" dirty="0"/>
-              <a:t>Run when environment has changed, but installation has not</a:t>
-            </a:r>
+              <a:rPr lang="en-US" sz="2400" dirty="0"/>
+              <a:t>Builds source code, includes all components of validation into </a:t>
+            </a:r>
+            <a:r>
+              <a:rPr lang="en-US" sz="2400" dirty="0" err="1"/>
+              <a:t>tarball</a:t>
+            </a:r>
+            <a:endParaRPr lang="en-US" sz="2400" dirty="0"/>
           </a:p>
           <a:p>
             <a:pPr marL="285750" indent="-285750">
               <a:buFont typeface="Arial" panose="020B0604020202020204" pitchFamily="34" charset="0"/>
               <a:buChar char="•"/>
             </a:pPr>
-            <a:endParaRPr lang="en-US" sz="2800" dirty="0"/>
+            <a:r>
+              <a:rPr lang="en-US" sz="2400" dirty="0"/>
+              <a:t>Installs and runs validation report on installed system</a:t>
+            </a:r>
           </a:p>
           <a:p>
             <a:pPr marL="285750" indent="-285750">
               <a:buFont typeface="Arial" panose="020B0604020202020204" pitchFamily="34" charset="0"/>
               <a:buChar char="•"/>
             </a:pPr>
-            <a:r>
-              <a:rPr lang="en-US" sz="2800" dirty="0"/>
+            <a:endParaRPr lang="en-US" sz="2400" dirty="0"/>
+          </a:p>
+          <a:p>
+            <a:pPr marL="285750" indent="-285750">
+              <a:buFont typeface="Arial" panose="020B0604020202020204" pitchFamily="34" charset="0"/>
+              <a:buChar char="•"/>
+            </a:pPr>
+            <a:r>
+              <a:rPr lang="en-US" sz="2400" dirty="0"/>
               <a:t>Best for:</a:t>
             </a:r>
           </a:p>
@@ -6056,7 +6156,7 @@
               <a:buChar char="•"/>
             </a:pPr>
             <a:r>
-              <a:rPr lang="en-US" sz="2800" dirty="0"/>
+              <a:rPr lang="en-US" sz="2400" dirty="0"/>
               <a:t>Installation is controlled by IT Administration</a:t>
             </a:r>
           </a:p>
@@ -6066,23 +6166,16 @@
               <a:buChar char="•"/>
             </a:pPr>
             <a:r>
-              <a:rPr lang="en-US" sz="2800" dirty="0"/>
-              <a:t>Users who need to verify that environment changes does not affect validation performance</a:t>
-            </a:r>
-          </a:p>
-          <a:p>
-            <a:pPr marL="285750" indent="-285750">
-              <a:buFont typeface="Arial" panose="020B0604020202020204" pitchFamily="34" charset="0"/>
-              <a:buChar char="•"/>
-            </a:pPr>
-            <a:endParaRPr lang="en-US" sz="2800" dirty="0"/>
+              <a:rPr lang="en-US" sz="2400" dirty="0"/>
+              <a:t>Validation Report needs co-located with installed package</a:t>
+            </a:r>
           </a:p>
         </p:txBody>
       </p:sp>
     </p:spTree>
     <p:extLst>
       <p:ext uri="{BB962C8B-B14F-4D97-AF65-F5344CB8AC3E}">
-        <p14:creationId xmlns:p14="http://schemas.microsoft.com/office/powerpoint/2010/main" val="1824346252"/>
+        <p14:creationId xmlns:p14="http://schemas.microsoft.com/office/powerpoint/2010/main" val="1253925520"/>
       </p:ext>
     </p:extLst>
   </p:cSld>
@@ -6114,7 +6207,7 @@
           <p:cNvPr id="2" name="Title 1">
             <a:extLst>
               <a:ext uri="{FF2B5EF4-FFF2-40B4-BE49-F238E27FC236}">
-                <a16:creationId xmlns:a16="http://schemas.microsoft.com/office/drawing/2014/main" id="{7614332B-4F24-42F4-A704-A6F1183E9470}"/>
+                <a16:creationId xmlns:a16="http://schemas.microsoft.com/office/drawing/2014/main" xmlns="" id="{7614332B-4F24-42F4-A704-A6F1183E9470}"/>
               </a:ext>
             </a:extLst>
           </p:cNvPr>
@@ -6132,7 +6225,7 @@
           <a:p>
             <a:r>
               <a:rPr lang="en-US" dirty="0"/>
-              <a:t>Build</a:t>
+              <a:t>Re-Validation</a:t>
             </a:r>
           </a:p>
         </p:txBody>
@@ -6140,7 +6233,7 @@
     </p:spTree>
     <p:extLst>
       <p:ext uri="{BB962C8B-B14F-4D97-AF65-F5344CB8AC3E}">
-        <p14:creationId xmlns:p14="http://schemas.microsoft.com/office/powerpoint/2010/main" val="3899725400"/>
+        <p14:creationId xmlns:p14="http://schemas.microsoft.com/office/powerpoint/2010/main" val="2872044130"/>
       </p:ext>
     </p:extLst>
   </p:cSld>
@@ -6172,7 +6265,7 @@
           <p:cNvPr id="8" name="Title 7">
             <a:extLst>
               <a:ext uri="{FF2B5EF4-FFF2-40B4-BE49-F238E27FC236}">
-                <a16:creationId xmlns:a16="http://schemas.microsoft.com/office/drawing/2014/main" id="{6A34AC25-F9D4-48D7-A664-C590D06BF559}"/>
+                <a16:creationId xmlns:a16="http://schemas.microsoft.com/office/drawing/2014/main" xmlns="" id="{6A34AC25-F9D4-48D7-A664-C590D06BF559}"/>
               </a:ext>
             </a:extLst>
           </p:cNvPr>
@@ -6190,7 +6283,7 @@
           <a:p>
             <a:r>
               <a:rPr lang="en-US" dirty="0" err="1"/>
-              <a:t>vt_validate_build</a:t>
+              <a:t>vt_validate_installed_package</a:t>
             </a:r>
             <a:r>
               <a:rPr lang="en-US" dirty="0"/>
@@ -6204,7 +6297,7 @@
           <p:cNvPr id="5" name="TextBox 4">
             <a:extLst>
               <a:ext uri="{FF2B5EF4-FFF2-40B4-BE49-F238E27FC236}">
-                <a16:creationId xmlns:a16="http://schemas.microsoft.com/office/drawing/2014/main" id="{EF5BA94D-0FB3-4C60-9994-8A309B690D97}"/>
+                <a16:creationId xmlns:a16="http://schemas.microsoft.com/office/drawing/2014/main" xmlns="" id="{EF5BA94D-0FB3-4C60-9994-8A309B690D97}"/>
               </a:ext>
             </a:extLst>
           </p:cNvPr>
@@ -6213,8 +6306,8 @@
         </p:nvSpPr>
         <p:spPr>
           <a:xfrm>
-            <a:off x="1286933" y="2218267"/>
-            <a:ext cx="10905067" cy="4401205"/>
+            <a:off x="1253479" y="1694160"/>
+            <a:ext cx="10321487" cy="5262979"/>
           </a:xfrm>
           <a:prstGeom prst="rect">
             <a:avLst/>
@@ -6233,41 +6326,32 @@
             </a:pPr>
             <a:r>
               <a:rPr lang="en-US" sz="2800" dirty="0"/>
-              <a:t>Temporarily installs the package and executes the validation Rmd</a:t>
-            </a:r>
-          </a:p>
-          <a:p>
-            <a:pPr marL="285750" indent="-285750">
-              <a:buFont typeface="Arial" panose="020B0604020202020204" pitchFamily="34" charset="0"/>
-              <a:buChar char="•"/>
-            </a:pPr>
+              <a:t>ONLY works for packages installed via `</a:t>
+            </a:r>
+            <a:r>
+              <a:rPr lang="en-US" sz="2800" dirty="0" err="1"/>
+              <a:t>vt_validate_install</a:t>
+            </a:r>
             <a:r>
               <a:rPr lang="en-US" sz="2800" dirty="0"/>
-              <a:t>Copies contents into “output” directory – </a:t>
-            </a:r>
-            <a:r>
-              <a:rPr lang="en-US" sz="2800" dirty="0" err="1"/>
-              <a:t>inst</a:t>
-            </a:r>
-            <a:r>
-              <a:rPr lang="en-US" sz="2800" dirty="0"/>
-              <a:t>/validation</a:t>
-            </a:r>
-          </a:p>
-          <a:p>
-            <a:pPr marL="285750" indent="-285750">
-              <a:buFont typeface="Arial" panose="020B0604020202020204" pitchFamily="34" charset="0"/>
-              <a:buChar char="•"/>
-            </a:pPr>
-            <a:r>
-              <a:rPr lang="en-US" sz="2800" dirty="0"/>
-              <a:t>Builds source code, includes all components of validation into </a:t>
+              <a:t>()` or installed from </a:t>
             </a:r>
             <a:r>
               <a:rPr lang="en-US" sz="2800" dirty="0" err="1"/>
               <a:t>tarball</a:t>
             </a:r>
-            <a:endParaRPr lang="en-US" sz="2800" dirty="0"/>
+            <a:r>
+              <a:rPr lang="en-US" sz="2800" dirty="0"/>
+              <a:t> created by `</a:t>
+            </a:r>
+            <a:r>
+              <a:rPr lang="en-US" sz="2800" dirty="0" err="1"/>
+              <a:t>vt_validate_build</a:t>
+            </a:r>
+            <a:r>
+              <a:rPr lang="en-US" sz="2800" dirty="0"/>
+              <a:t>()`</a:t>
+            </a:r>
           </a:p>
           <a:p>
             <a:pPr marL="285750" indent="-285750">
@@ -6283,7 +6367,7 @@
             </a:pPr>
             <a:r>
               <a:rPr lang="en-US" sz="2800" dirty="0"/>
-              <a:t>For release of source code with controlled versions</a:t>
+              <a:t>Run when environment has changed, but installation has not</a:t>
             </a:r>
           </a:p>
           <a:p>
@@ -6300,7 +6384,27 @@
             </a:pPr>
             <a:r>
               <a:rPr lang="en-US" sz="2800" dirty="0"/>
-              <a:t>Users have access to install as necessary</a:t>
+              <a:t>Best for:</a:t>
+            </a:r>
+          </a:p>
+          <a:p>
+            <a:pPr marL="742950" lvl="1" indent="-285750">
+              <a:buFont typeface="Arial" panose="020B0604020202020204" pitchFamily="34" charset="0"/>
+              <a:buChar char="•"/>
+            </a:pPr>
+            <a:r>
+              <a:rPr lang="en-US" sz="2800" dirty="0"/>
+              <a:t>Installation is controlled by IT Administration</a:t>
+            </a:r>
+          </a:p>
+          <a:p>
+            <a:pPr marL="742950" lvl="1" indent="-285750">
+              <a:buFont typeface="Arial" panose="020B0604020202020204" pitchFamily="34" charset="0"/>
+              <a:buChar char="•"/>
+            </a:pPr>
+            <a:r>
+              <a:rPr lang="en-US" sz="2800" dirty="0"/>
+              <a:t>Users who need to verify that environment changes does not affect validation performance</a:t>
             </a:r>
           </a:p>
           <a:p>
@@ -6315,7 +6419,7 @@
     </p:spTree>
     <p:extLst>
       <p:ext uri="{BB962C8B-B14F-4D97-AF65-F5344CB8AC3E}">
-        <p14:creationId xmlns:p14="http://schemas.microsoft.com/office/powerpoint/2010/main" val="1540812988"/>
+        <p14:creationId xmlns:p14="http://schemas.microsoft.com/office/powerpoint/2010/main" val="1824346252"/>
       </p:ext>
     </p:extLst>
   </p:cSld>
@@ -6344,10 +6448,10 @@
       </p:grpSpPr>
       <p:sp>
         <p:nvSpPr>
-          <p:cNvPr id="2" name="Title 1">
+          <p:cNvPr id="8" name="Title 7">
             <a:extLst>
               <a:ext uri="{FF2B5EF4-FFF2-40B4-BE49-F238E27FC236}">
-                <a16:creationId xmlns:a16="http://schemas.microsoft.com/office/drawing/2014/main" id="{7614332B-4F24-42F4-A704-A6F1183E9470}"/>
+                <a16:creationId xmlns:a16="http://schemas.microsoft.com/office/drawing/2014/main" xmlns="" id="{6A34AC25-F9D4-48D7-A664-C590D06BF559}"/>
               </a:ext>
             </a:extLst>
           </p:cNvPr>
@@ -6355,65 +6459,204 @@
             <a:spLocks noGrp="1"/>
           </p:cNvSpPr>
           <p:nvPr>
-            <p:ph type="ctrTitle"/>
+            <p:ph type="title"/>
           </p:nvPr>
         </p:nvSpPr>
         <p:spPr/>
         <p:txBody>
-          <a:bodyPr>
-            <a:normAutofit/>
-          </a:bodyPr>
+          <a:bodyPr/>
           <a:lstStyle/>
           <a:p>
             <a:r>
-              <a:rPr lang="en-US" dirty="0"/>
-              <a:t>Materials 04-E3</a:t>
-            </a:r>
-          </a:p>
-        </p:txBody>
-      </p:sp>
-      <p:sp>
-        <p:nvSpPr>
-          <p:cNvPr id="3" name="Rectangle 2">
+              <a:rPr lang="en-US" dirty="0" smtClean="0"/>
+              <a:t>Modes of Validation &amp; Validation Report Generation</a:t>
+            </a:r>
+            <a:endParaRPr lang="en-US" dirty="0"/>
+          </a:p>
+        </p:txBody>
+      </p:sp>
+      <p:sp>
+        <p:nvSpPr>
+          <p:cNvPr id="5" name="TextBox 4">
             <a:extLst>
               <a:ext uri="{FF2B5EF4-FFF2-40B4-BE49-F238E27FC236}">
-                <a16:creationId xmlns:a16="http://schemas.microsoft.com/office/drawing/2014/main" id="{B700F5C8-C07C-4EBC-BA27-4FA916A5F10D}"/>
+                <a16:creationId xmlns:a16="http://schemas.microsoft.com/office/drawing/2014/main" xmlns="" id="{EF5BA94D-0FB3-4C60-9994-8A309B690D97}"/>
               </a:ext>
             </a:extLst>
           </p:cNvPr>
-          <p:cNvSpPr/>
+          <p:cNvSpPr txBox="1"/>
           <p:nvPr/>
         </p:nvSpPr>
         <p:spPr>
           <a:xfrm>
-            <a:off x="1371685" y="4682062"/>
-            <a:ext cx="9448630" cy="369332"/>
+            <a:off x="1286933" y="2218267"/>
+            <a:ext cx="10905067" cy="3108543"/>
           </a:xfrm>
           <a:prstGeom prst="rect">
             <a:avLst/>
           </a:prstGeom>
+          <a:noFill/>
         </p:spPr>
         <p:txBody>
-          <a:bodyPr wrap="square">
+          <a:bodyPr wrap="square" rtlCol="0">
             <a:spAutoFit/>
           </a:bodyPr>
           <a:lstStyle/>
           <a:p>
-            <a:pPr algn="ctr"/>
-            <a:r>
-              <a:rPr lang="en-US" dirty="0">
-                <a:solidFill>
-                  <a:srgbClr val="002060"/>
-                </a:solidFill>
-                <a:latin typeface="-apple-system"/>
-              </a:rPr>
-              <a:t>Materials/Materials-04-Introduction_to_Valtools/Materials-04-E03-Validation_Modes</a:t>
-            </a:r>
-            <a:endParaRPr lang="en-US" dirty="0">
-              <a:solidFill>
-                <a:srgbClr val="002060"/>
-              </a:solidFill>
-            </a:endParaRPr>
+            <a:pPr marL="285750" indent="-285750">
+              <a:buFont typeface="Arial" panose="020B0604020202020204" pitchFamily="34" charset="0"/>
+              <a:buChar char="•"/>
+            </a:pPr>
+            <a:r>
+              <a:rPr lang="en-US" sz="2800" dirty="0" err="1"/>
+              <a:t>vt_validate_report</a:t>
+            </a:r>
+            <a:r>
+              <a:rPr lang="en-US" sz="2800" dirty="0" smtClean="0"/>
+              <a:t>() – Also for validation packets</a:t>
+            </a:r>
+          </a:p>
+          <a:p>
+            <a:endParaRPr lang="en-US" sz="2800" dirty="0" smtClean="0"/>
+          </a:p>
+          <a:p>
+            <a:pPr marL="285750" indent="-285750">
+              <a:buFont typeface="Arial" panose="020B0604020202020204" pitchFamily="34" charset="0"/>
+              <a:buChar char="•"/>
+            </a:pPr>
+            <a:r>
+              <a:rPr lang="en-US" sz="2800" dirty="0" err="1"/>
+              <a:t>vt_validate_source</a:t>
+            </a:r>
+            <a:r>
+              <a:rPr lang="en-US" sz="2800" dirty="0" smtClean="0"/>
+              <a:t>() – Intended for internal packages</a:t>
+            </a:r>
+          </a:p>
+          <a:p>
+            <a:pPr marL="285750" indent="-285750">
+              <a:buFont typeface="Arial" panose="020B0604020202020204" pitchFamily="34" charset="0"/>
+              <a:buChar char="•"/>
+            </a:pPr>
+            <a:r>
+              <a:rPr lang="en-US" sz="2800" dirty="0" err="1"/>
+              <a:t>vt_validate_build</a:t>
+            </a:r>
+            <a:r>
+              <a:rPr lang="en-US" sz="2800" dirty="0" smtClean="0"/>
+              <a:t>()</a:t>
+            </a:r>
+          </a:p>
+          <a:p>
+            <a:pPr marL="285750" indent="-285750">
+              <a:buFont typeface="Arial" panose="020B0604020202020204" pitchFamily="34" charset="0"/>
+              <a:buChar char="•"/>
+            </a:pPr>
+            <a:r>
+              <a:rPr lang="en-US" sz="2800" dirty="0" err="1" smtClean="0"/>
+              <a:t>vt_validate_install</a:t>
+            </a:r>
+            <a:r>
+              <a:rPr lang="en-US" sz="2800" dirty="0" smtClean="0"/>
+              <a:t>()</a:t>
+            </a:r>
+          </a:p>
+          <a:p>
+            <a:pPr marL="285750" indent="-285750">
+              <a:buFont typeface="Arial" panose="020B0604020202020204" pitchFamily="34" charset="0"/>
+              <a:buChar char="•"/>
+            </a:pPr>
+            <a:r>
+              <a:rPr lang="en-US" sz="2800" dirty="0" err="1"/>
+              <a:t>vt_validate_installed_package</a:t>
+            </a:r>
+            <a:r>
+              <a:rPr lang="en-US" sz="2800" dirty="0"/>
+              <a:t>()</a:t>
+            </a:r>
+            <a:endParaRPr lang="en-US" sz="2800" dirty="0" smtClean="0"/>
+          </a:p>
+          <a:p>
+            <a:pPr marL="285750" indent="-285750">
+              <a:buFont typeface="Arial" panose="020B0604020202020204" pitchFamily="34" charset="0"/>
+              <a:buChar char="•"/>
+            </a:pPr>
+            <a:endParaRPr lang="en-US" sz="2800" dirty="0"/>
+          </a:p>
+        </p:txBody>
+      </p:sp>
+    </p:spTree>
+    <p:extLst>
+      <p:ext uri="{BB962C8B-B14F-4D97-AF65-F5344CB8AC3E}">
+        <p14:creationId xmlns:p14="http://schemas.microsoft.com/office/powerpoint/2010/main" val="1058736657"/>
+      </p:ext>
+    </p:extLst>
+  </p:cSld>
+  <p:clrMapOvr>
+    <a:masterClrMapping/>
+  </p:clrMapOvr>
+</p:sld>
+</file>
+
+<file path=ppt/slides/slide14.xml><?xml version="1.0" encoding="utf-8"?>
+<p:sld xmlns:a="http://schemas.openxmlformats.org/drawingml/2006/main" xmlns:r="http://schemas.openxmlformats.org/officeDocument/2006/relationships" xmlns:p="http://schemas.openxmlformats.org/presentationml/2006/main">
+  <p:cSld>
+    <p:spTree>
+      <p:nvGrpSpPr>
+        <p:cNvPr id="1" name=""/>
+        <p:cNvGrpSpPr/>
+        <p:nvPr/>
+      </p:nvGrpSpPr>
+      <p:grpSpPr>
+        <a:xfrm>
+          <a:off x="0" y="0"/>
+          <a:ext cx="0" cy="0"/>
+          <a:chOff x="0" y="0"/>
+          <a:chExt cx="0" cy="0"/>
+        </a:xfrm>
+      </p:grpSpPr>
+      <p:sp>
+        <p:nvSpPr>
+          <p:cNvPr id="2" name="Title 1">
+            <a:extLst>
+              <a:ext uri="{FF2B5EF4-FFF2-40B4-BE49-F238E27FC236}">
+                <a16:creationId xmlns:a16="http://schemas.microsoft.com/office/drawing/2014/main" xmlns="" id="{7614332B-4F24-42F4-A704-A6F1183E9470}"/>
+              </a:ext>
+            </a:extLst>
+          </p:cNvPr>
+          <p:cNvSpPr>
+            <a:spLocks noGrp="1"/>
+          </p:cNvSpPr>
+          <p:nvPr>
+            <p:ph type="ctrTitle"/>
+          </p:nvPr>
+        </p:nvSpPr>
+        <p:spPr/>
+        <p:txBody>
+          <a:bodyPr>
+            <a:normAutofit fontScale="90000"/>
+          </a:bodyPr>
+          <a:lstStyle/>
+          <a:p>
+            <a:r>
+              <a:rPr lang="en-US" dirty="0"/>
+              <a:t>Complete</a:t>
+            </a:r>
+            <a:br>
+              <a:rPr lang="en-US" dirty="0"/>
+            </a:br>
+            <a:r>
+              <a:rPr lang="en-US" dirty="0"/>
+              <a:t/>
+            </a:r>
+            <a:br>
+              <a:rPr lang="en-US" dirty="0"/>
+            </a:br>
+            <a:r>
+              <a:rPr lang="en-US" dirty="0" smtClean="0"/>
+              <a:t>Exercise 06</a:t>
+            </a:r>
+            <a:endParaRPr lang="en-US" dirty="0"/>
           </a:p>
         </p:txBody>
       </p:sp>
@@ -6452,7 +6695,7 @@
           <p:cNvPr id="2" name="Title 1">
             <a:extLst>
               <a:ext uri="{FF2B5EF4-FFF2-40B4-BE49-F238E27FC236}">
-                <a16:creationId xmlns:a16="http://schemas.microsoft.com/office/drawing/2014/main" id="{749E0D1B-C9EF-4CB6-9922-ED9D4AC52C59}"/>
+                <a16:creationId xmlns:a16="http://schemas.microsoft.com/office/drawing/2014/main" xmlns="" id="{749E0D1B-C9EF-4CB6-9922-ED9D4AC52C59}"/>
               </a:ext>
             </a:extLst>
           </p:cNvPr>
@@ -6480,7 +6723,7 @@
           <p:cNvPr id="5" name="Content Placeholder 4">
             <a:extLst>
               <a:ext uri="{FF2B5EF4-FFF2-40B4-BE49-F238E27FC236}">
-                <a16:creationId xmlns:a16="http://schemas.microsoft.com/office/drawing/2014/main" id="{7E558183-391D-4056-BC02-A181C5440B05}"/>
+                <a16:creationId xmlns:a16="http://schemas.microsoft.com/office/drawing/2014/main" xmlns="" id="{7E558183-391D-4056-BC02-A181C5440B05}"/>
               </a:ext>
             </a:extLst>
           </p:cNvPr>
@@ -6590,7 +6833,7 @@
           <p:cNvPr id="2" name="Title 1">
             <a:extLst>
               <a:ext uri="{FF2B5EF4-FFF2-40B4-BE49-F238E27FC236}">
-                <a16:creationId xmlns:a16="http://schemas.microsoft.com/office/drawing/2014/main" id="{7614332B-4F24-42F4-A704-A6F1183E9470}"/>
+                <a16:creationId xmlns:a16="http://schemas.microsoft.com/office/drawing/2014/main" xmlns="" id="{7614332B-4F24-42F4-A704-A6F1183E9470}"/>
               </a:ext>
             </a:extLst>
           </p:cNvPr>
@@ -6653,7 +6896,7 @@
           <p:cNvPr id="8" name="Title 7">
             <a:extLst>
               <a:ext uri="{FF2B5EF4-FFF2-40B4-BE49-F238E27FC236}">
-                <a16:creationId xmlns:a16="http://schemas.microsoft.com/office/drawing/2014/main" id="{6A34AC25-F9D4-48D7-A664-C590D06BF559}"/>
+                <a16:creationId xmlns:a16="http://schemas.microsoft.com/office/drawing/2014/main" xmlns="" id="{6A34AC25-F9D4-48D7-A664-C590D06BF559}"/>
               </a:ext>
             </a:extLst>
           </p:cNvPr>
@@ -6685,7 +6928,7 @@
           <p:cNvPr id="5" name="TextBox 4">
             <a:extLst>
               <a:ext uri="{FF2B5EF4-FFF2-40B4-BE49-F238E27FC236}">
-                <a16:creationId xmlns:a16="http://schemas.microsoft.com/office/drawing/2014/main" id="{EF5BA94D-0FB3-4C60-9994-8A309B690D97}"/>
+                <a16:creationId xmlns:a16="http://schemas.microsoft.com/office/drawing/2014/main" xmlns="" id="{EF5BA94D-0FB3-4C60-9994-8A309B690D97}"/>
               </a:ext>
             </a:extLst>
           </p:cNvPr>
@@ -6784,7 +7027,7 @@
           <p:cNvPr id="2" name="Title 1">
             <a:extLst>
               <a:ext uri="{FF2B5EF4-FFF2-40B4-BE49-F238E27FC236}">
-                <a16:creationId xmlns:a16="http://schemas.microsoft.com/office/drawing/2014/main" id="{7614332B-4F24-42F4-A704-A6F1183E9470}"/>
+                <a16:creationId xmlns:a16="http://schemas.microsoft.com/office/drawing/2014/main" xmlns="" id="{7614332B-4F24-42F4-A704-A6F1183E9470}"/>
               </a:ext>
             </a:extLst>
           </p:cNvPr>
@@ -6842,7 +7085,7 @@
           <p:cNvPr id="8" name="Title 7">
             <a:extLst>
               <a:ext uri="{FF2B5EF4-FFF2-40B4-BE49-F238E27FC236}">
-                <a16:creationId xmlns:a16="http://schemas.microsoft.com/office/drawing/2014/main" id="{6A34AC25-F9D4-48D7-A664-C590D06BF559}"/>
+                <a16:creationId xmlns:a16="http://schemas.microsoft.com/office/drawing/2014/main" xmlns="" id="{6A34AC25-F9D4-48D7-A664-C590D06BF559}"/>
               </a:ext>
             </a:extLst>
           </p:cNvPr>
@@ -6874,7 +7117,7 @@
           <p:cNvPr id="5" name="TextBox 4">
             <a:extLst>
               <a:ext uri="{FF2B5EF4-FFF2-40B4-BE49-F238E27FC236}">
-                <a16:creationId xmlns:a16="http://schemas.microsoft.com/office/drawing/2014/main" id="{EF5BA94D-0FB3-4C60-9994-8A309B690D97}"/>
+                <a16:creationId xmlns:a16="http://schemas.microsoft.com/office/drawing/2014/main" xmlns="" id="{EF5BA94D-0FB3-4C60-9994-8A309B690D97}"/>
               </a:ext>
             </a:extLst>
           </p:cNvPr>
@@ -7052,7 +7295,7 @@
           <p:cNvPr id="2" name="Title 1">
             <a:extLst>
               <a:ext uri="{FF2B5EF4-FFF2-40B4-BE49-F238E27FC236}">
-                <a16:creationId xmlns:a16="http://schemas.microsoft.com/office/drawing/2014/main" id="{7614332B-4F24-42F4-A704-A6F1183E9470}"/>
+                <a16:creationId xmlns:a16="http://schemas.microsoft.com/office/drawing/2014/main" xmlns="" id="{7614332B-4F24-42F4-A704-A6F1183E9470}"/>
               </a:ext>
             </a:extLst>
           </p:cNvPr>
@@ -7070,7 +7313,7 @@
           <a:p>
             <a:r>
               <a:rPr lang="en-US" dirty="0"/>
-              <a:t>INSTALL</a:t>
+              <a:t>Build</a:t>
             </a:r>
           </a:p>
         </p:txBody>
@@ -7078,7 +7321,7 @@
     </p:spTree>
     <p:extLst>
       <p:ext uri="{BB962C8B-B14F-4D97-AF65-F5344CB8AC3E}">
-        <p14:creationId xmlns:p14="http://schemas.microsoft.com/office/powerpoint/2010/main" val="4109606292"/>
+        <p14:creationId xmlns:p14="http://schemas.microsoft.com/office/powerpoint/2010/main" val="3899725400"/>
       </p:ext>
     </p:extLst>
   </p:cSld>
@@ -7110,7 +7353,7 @@
           <p:cNvPr id="8" name="Title 7">
             <a:extLst>
               <a:ext uri="{FF2B5EF4-FFF2-40B4-BE49-F238E27FC236}">
-                <a16:creationId xmlns:a16="http://schemas.microsoft.com/office/drawing/2014/main" id="{6A34AC25-F9D4-48D7-A664-C590D06BF559}"/>
+                <a16:creationId xmlns:a16="http://schemas.microsoft.com/office/drawing/2014/main" xmlns="" id="{6A34AC25-F9D4-48D7-A664-C590D06BF559}"/>
               </a:ext>
             </a:extLst>
           </p:cNvPr>
@@ -7128,7 +7371,7 @@
           <a:p>
             <a:r>
               <a:rPr lang="en-US" dirty="0" err="1"/>
-              <a:t>vt_validate_install</a:t>
+              <a:t>vt_validate_build</a:t>
             </a:r>
             <a:r>
               <a:rPr lang="en-US" dirty="0"/>
@@ -7142,7 +7385,7 @@
           <p:cNvPr id="5" name="TextBox 4">
             <a:extLst>
               <a:ext uri="{FF2B5EF4-FFF2-40B4-BE49-F238E27FC236}">
-                <a16:creationId xmlns:a16="http://schemas.microsoft.com/office/drawing/2014/main" id="{EF5BA94D-0FB3-4C60-9994-8A309B690D97}"/>
+                <a16:creationId xmlns:a16="http://schemas.microsoft.com/office/drawing/2014/main" xmlns="" id="{EF5BA94D-0FB3-4C60-9994-8A309B690D97}"/>
               </a:ext>
             </a:extLst>
           </p:cNvPr>
@@ -7151,8 +7394,8 @@
         </p:nvSpPr>
         <p:spPr>
           <a:xfrm>
-            <a:off x="1609494" y="2296326"/>
-            <a:ext cx="9630936" cy="4154984"/>
+            <a:off x="1286933" y="2218267"/>
+            <a:ext cx="10905067" cy="4401205"/>
           </a:xfrm>
           <a:prstGeom prst="rect">
             <a:avLst/>
@@ -7170,7 +7413,7 @@
               <a:buChar char="•"/>
             </a:pPr>
             <a:r>
-              <a:rPr lang="en-US" sz="2400" dirty="0"/>
+              <a:rPr lang="en-US" sz="2800" dirty="0"/>
               <a:t>Temporarily installs the package and executes the validation Rmd</a:t>
             </a:r>
           </a:p>
@@ -7180,15 +7423,15 @@
               <a:buChar char="•"/>
             </a:pPr>
             <a:r>
-              <a:rPr lang="en-US" sz="2400" dirty="0"/>
+              <a:rPr lang="en-US" sz="2800" dirty="0"/>
               <a:t>Copies contents into “output” directory – </a:t>
             </a:r>
             <a:r>
-              <a:rPr lang="en-US" sz="2400" dirty="0" err="1"/>
+              <a:rPr lang="en-US" sz="2800" dirty="0" err="1"/>
               <a:t>inst</a:t>
             </a:r>
             <a:r>
-              <a:rPr lang="en-US" sz="2400" dirty="0"/>
+              <a:rPr lang="en-US" sz="2800" dirty="0"/>
               <a:t>/validation</a:t>
             </a:r>
           </a:p>
@@ -7198,68 +7441,62 @@
               <a:buChar char="•"/>
             </a:pPr>
             <a:r>
-              <a:rPr lang="en-US" sz="2400" dirty="0"/>
+              <a:rPr lang="en-US" sz="2800" dirty="0"/>
               <a:t>Builds source code, includes all components of validation into </a:t>
             </a:r>
             <a:r>
-              <a:rPr lang="en-US" sz="2400" dirty="0" err="1"/>
+              <a:rPr lang="en-US" sz="2800" dirty="0" err="1"/>
               <a:t>tarball</a:t>
             </a:r>
-            <a:endParaRPr lang="en-US" sz="2400" dirty="0"/>
+            <a:endParaRPr lang="en-US" sz="2800" dirty="0"/>
           </a:p>
           <a:p>
             <a:pPr marL="285750" indent="-285750">
               <a:buFont typeface="Arial" panose="020B0604020202020204" pitchFamily="34" charset="0"/>
               <a:buChar char="•"/>
             </a:pPr>
-            <a:r>
-              <a:rPr lang="en-US" sz="2400" dirty="0"/>
-              <a:t>Installs and runs validation report on installed system</a:t>
-            </a:r>
+            <a:endParaRPr lang="en-US" sz="2800" dirty="0"/>
           </a:p>
           <a:p>
             <a:pPr marL="285750" indent="-285750">
               <a:buFont typeface="Arial" panose="020B0604020202020204" pitchFamily="34" charset="0"/>
               <a:buChar char="•"/>
             </a:pPr>
-            <a:endParaRPr lang="en-US" sz="2400" dirty="0"/>
+            <a:r>
+              <a:rPr lang="en-US" sz="2800" dirty="0"/>
+              <a:t>For release of source code with controlled versions</a:t>
+            </a:r>
           </a:p>
           <a:p>
             <a:pPr marL="285750" indent="-285750">
               <a:buFont typeface="Arial" panose="020B0604020202020204" pitchFamily="34" charset="0"/>
               <a:buChar char="•"/>
             </a:pPr>
-            <a:r>
-              <a:rPr lang="en-US" sz="2400" dirty="0"/>
-              <a:t>Best for:</a:t>
-            </a:r>
-          </a:p>
-          <a:p>
-            <a:pPr marL="742950" lvl="1" indent="-285750">
+            <a:endParaRPr lang="en-US" sz="2800" dirty="0"/>
+          </a:p>
+          <a:p>
+            <a:pPr marL="285750" indent="-285750">
               <a:buFont typeface="Arial" panose="020B0604020202020204" pitchFamily="34" charset="0"/>
               <a:buChar char="•"/>
             </a:pPr>
             <a:r>
-              <a:rPr lang="en-US" sz="2400" dirty="0"/>
-              <a:t>Installation is controlled by IT Administration</a:t>
-            </a:r>
-          </a:p>
-          <a:p>
-            <a:pPr marL="742950" lvl="1" indent="-285750">
+              <a:rPr lang="en-US" sz="2800" dirty="0"/>
+              <a:t>Users have access to install as necessary</a:t>
+            </a:r>
+          </a:p>
+          <a:p>
+            <a:pPr marL="285750" indent="-285750">
               <a:buFont typeface="Arial" panose="020B0604020202020204" pitchFamily="34" charset="0"/>
               <a:buChar char="•"/>
             </a:pPr>
-            <a:r>
-              <a:rPr lang="en-US" sz="2400" dirty="0"/>
-              <a:t>Validation Report needs co-located with installed package</a:t>
-            </a:r>
+            <a:endParaRPr lang="en-US" sz="2800" dirty="0"/>
           </a:p>
         </p:txBody>
       </p:sp>
     </p:spTree>
     <p:extLst>
       <p:ext uri="{BB962C8B-B14F-4D97-AF65-F5344CB8AC3E}">
-        <p14:creationId xmlns:p14="http://schemas.microsoft.com/office/powerpoint/2010/main" val="1253925520"/>
+        <p14:creationId xmlns:p14="http://schemas.microsoft.com/office/powerpoint/2010/main" val="1540812988"/>
       </p:ext>
     </p:extLst>
   </p:cSld>
@@ -7291,7 +7528,7 @@
           <p:cNvPr id="2" name="Title 1">
             <a:extLst>
               <a:ext uri="{FF2B5EF4-FFF2-40B4-BE49-F238E27FC236}">
-                <a16:creationId xmlns:a16="http://schemas.microsoft.com/office/drawing/2014/main" id="{7614332B-4F24-42F4-A704-A6F1183E9470}"/>
+                <a16:creationId xmlns:a16="http://schemas.microsoft.com/office/drawing/2014/main" xmlns="" id="{7614332B-4F24-42F4-A704-A6F1183E9470}"/>
               </a:ext>
             </a:extLst>
           </p:cNvPr>
@@ -7309,7 +7546,7 @@
           <a:p>
             <a:r>
               <a:rPr lang="en-US" dirty="0"/>
-              <a:t>Re-Validation</a:t>
+              <a:t>INSTALL</a:t>
             </a:r>
           </a:p>
         </p:txBody>
@@ -7317,7 +7554,7 @@
     </p:spTree>
     <p:extLst>
       <p:ext uri="{BB962C8B-B14F-4D97-AF65-F5344CB8AC3E}">
-        <p14:creationId xmlns:p14="http://schemas.microsoft.com/office/powerpoint/2010/main" val="2872044130"/>
+        <p14:creationId xmlns:p14="http://schemas.microsoft.com/office/powerpoint/2010/main" val="4109606292"/>
       </p:ext>
     </p:extLst>
   </p:cSld>
@@ -7597,7 +7834,7 @@
   <a:extraClrSchemeLst/>
   <a:extLst>
     <a:ext uri="{05A4C25C-085E-4340-85A3-A5531E510DB2}">
-      <thm15:themeFamily xmlns:thm15="http://schemas.microsoft.com/office/thememl/2012/main" name="Original 5_01_Win32" id="{77344C68-A3F1-476B-8680-97D7F429B46B}" vid="{89780073-58E8-4DFF-BF29-BA99F8052841}"/>
+      <thm15:themeFamily xmlns:thm15="http://schemas.microsoft.com/office/thememl/2012/main" xmlns="" name="Original 5_01_Win32" id="{77344C68-A3F1-476B-8680-97D7F429B46B}" vid="{89780073-58E8-4DFF-BF29-BA99F8052841}"/>
     </a:ext>
   </a:extLst>
 </a:theme>
@@ -7892,31 +8129,13 @@
   <a:extraClrSchemeLst/>
   <a:extLst>
     <a:ext uri="{05A4C25C-085E-4340-85A3-A5531E510DB2}">
-      <thm15:themeFamily xmlns:thm15="http://schemas.microsoft.com/office/thememl/2012/main" name="Office Theme" id="{62F939B6-93AF-4DB8-9C6B-D6C7DFDC589F}" vid="{4A3C46E8-61CC-4603-A589-7422A47A8E4A}"/>
+      <thm15:themeFamily xmlns:thm15="http://schemas.microsoft.com/office/thememl/2012/main" xmlns="" name="Office Theme" id="{62F939B6-93AF-4DB8-9C6B-D6C7DFDC589F}" vid="{4A3C46E8-61CC-4603-A589-7422A47A8E4A}"/>
     </a:ext>
   </a:extLst>
 </a:theme>
 </file>
 
 <file path=customXml/item1.xml><?xml version="1.0" encoding="utf-8"?>
-<p:properties xmlns:p="http://schemas.microsoft.com/office/2006/metadata/properties" xmlns:xsi="http://www.w3.org/2001/XMLSchema-instance" xmlns:pc="http://schemas.microsoft.com/office/infopath/2007/PartnerControls">
-  <documentManagement>
-    <Status xmlns="71af3243-3dd4-4a8d-8c0d-dd76da1f02a5">Not started</Status>
-    <MediaServiceKeyPoints xmlns="71af3243-3dd4-4a8d-8c0d-dd76da1f02a5" xsi:nil="true"/>
-  </documentManagement>
-</p:properties>
-</file>
-
-<file path=customXml/item2.xml><?xml version="1.0" encoding="utf-8"?>
-<?mso-contentType ?>
-<FormTemplates xmlns="http://schemas.microsoft.com/sharepoint/v3/contenttype/forms">
-  <Display>DocumentLibraryForm</Display>
-  <Edit>DocumentLibraryForm</Edit>
-  <New>DocumentLibraryForm</New>
-</FormTemplates>
-</file>
-
-<file path=customXml/item3.xml><?xml version="1.0" encoding="utf-8"?>
 <ct:contentTypeSchema xmlns:ct="http://schemas.microsoft.com/office/2006/metadata/contentType" xmlns:ma="http://schemas.microsoft.com/office/2006/metadata/properties/metaAttributes" ct:_="" ma:_="" ma:contentTypeName="Document" ma:contentTypeID="0x01010079F111ED35F8CC479449609E8A0923A6" ma:contentTypeVersion="12" ma:contentTypeDescription="Create a new document." ma:contentTypeScope="" ma:versionID="a410dd7f93c95333ffa1b60ed6adedd1">
   <xsd:schema xmlns:xsd="http://www.w3.org/2001/XMLSchema" xmlns:xs="http://www.w3.org/2001/XMLSchema" xmlns:p="http://schemas.microsoft.com/office/2006/metadata/properties" xmlns:ns2="71af3243-3dd4-4a8d-8c0d-dd76da1f02a5" xmlns:ns3="16c05727-aa75-4e4a-9b5f-8a80a1165891" targetNamespace="http://schemas.microsoft.com/office/2006/metadata/properties" ma:root="true" ma:fieldsID="a936d9baba76aa3866493feff160faab" ns2:_="" ns3:_="">
     <xsd:import namespace="71af3243-3dd4-4a8d-8c0d-dd76da1f02a5"/>
@@ -8137,32 +8356,25 @@
 </ct:contentTypeSchema>
 </file>
 
-<file path=customXml/itemProps1.xml><?xml version="1.0" encoding="utf-8"?>
-<ds:datastoreItem xmlns:ds="http://schemas.openxmlformats.org/officeDocument/2006/customXml" ds:itemID="{137651BA-F45C-4845-9AB3-E0A65B39F5E1}">
-  <ds:schemaRefs>
-    <ds:schemaRef ds:uri="http://schemas.microsoft.com/office/infopath/2007/PartnerControls"/>
-    <ds:schemaRef ds:uri="http://purl.org/dc/elements/1.1/"/>
-    <ds:schemaRef ds:uri="http://schemas.microsoft.com/office/2006/metadata/properties"/>
-    <ds:schemaRef ds:uri="http://purl.org/dc/terms/"/>
-    <ds:schemaRef ds:uri="http://schemas.openxmlformats.org/package/2006/metadata/core-properties"/>
-    <ds:schemaRef ds:uri="http://schemas.microsoft.com/office/2006/documentManagement/types"/>
-    <ds:schemaRef ds:uri="http://purl.org/dc/dcmitype/"/>
-    <ds:schemaRef ds:uri="16c05727-aa75-4e4a-9b5f-8a80a1165891"/>
-    <ds:schemaRef ds:uri="71af3243-3dd4-4a8d-8c0d-dd76da1f02a5"/>
-    <ds:schemaRef ds:uri="http://www.w3.org/XML/1998/namespace"/>
-  </ds:schemaRefs>
-</ds:datastoreItem>
+<file path=customXml/item2.xml><?xml version="1.0" encoding="utf-8"?>
+<?mso-contentType ?>
+<FormTemplates xmlns="http://schemas.microsoft.com/sharepoint/v3/contenttype/forms">
+  <Display>DocumentLibraryForm</Display>
+  <Edit>DocumentLibraryForm</Edit>
+  <New>DocumentLibraryForm</New>
+</FormTemplates>
 </file>
 
-<file path=customXml/itemProps2.xml><?xml version="1.0" encoding="utf-8"?>
-<ds:datastoreItem xmlns:ds="http://schemas.openxmlformats.org/officeDocument/2006/customXml" ds:itemID="{CDB58277-F8DF-46FF-84EC-EF41B835E69F}">
-  <ds:schemaRefs>
-    <ds:schemaRef ds:uri="http://schemas.microsoft.com/sharepoint/v3/contenttype/forms"/>
-  </ds:schemaRefs>
-</ds:datastoreItem>
+<file path=customXml/item3.xml><?xml version="1.0" encoding="utf-8"?>
+<p:properties xmlns:p="http://schemas.microsoft.com/office/2006/metadata/properties" xmlns:xsi="http://www.w3.org/2001/XMLSchema-instance" xmlns:pc="http://schemas.microsoft.com/office/infopath/2007/PartnerControls">
+  <documentManagement>
+    <Status xmlns="71af3243-3dd4-4a8d-8c0d-dd76da1f02a5">Not started</Status>
+    <MediaServiceKeyPoints xmlns="71af3243-3dd4-4a8d-8c0d-dd76da1f02a5" xsi:nil="true"/>
+  </documentManagement>
+</p:properties>
 </file>
 
-<file path=customXml/itemProps3.xml><?xml version="1.0" encoding="utf-8"?>
+<file path=customXml/itemProps1.xml><?xml version="1.0" encoding="utf-8"?>
 <ds:datastoreItem xmlns:ds="http://schemas.openxmlformats.org/officeDocument/2006/customXml" ds:itemID="{2D276E62-80A3-44DD-9BCC-97ED2B99B57F}">
   <ds:schemaRefs>
     <ds:schemaRef ds:uri="http://schemas.microsoft.com/office/2006/metadata/contentType"/>
@@ -8179,4 +8391,29 @@
     <ds:schemaRef ds:uri="http://schemas.microsoft.com/internal/obd"/>
   </ds:schemaRefs>
 </ds:datastoreItem>
+</file>
+
+<file path=customXml/itemProps2.xml><?xml version="1.0" encoding="utf-8"?>
+<ds:datastoreItem xmlns:ds="http://schemas.openxmlformats.org/officeDocument/2006/customXml" ds:itemID="{CDB58277-F8DF-46FF-84EC-EF41B835E69F}">
+  <ds:schemaRefs>
+    <ds:schemaRef ds:uri="http://schemas.microsoft.com/sharepoint/v3/contenttype/forms"/>
+  </ds:schemaRefs>
+</ds:datastoreItem>
+</file>
+
+<file path=customXml/itemProps3.xml><?xml version="1.0" encoding="utf-8"?>
+<ds:datastoreItem xmlns:ds="http://schemas.openxmlformats.org/officeDocument/2006/customXml" ds:itemID="{137651BA-F45C-4845-9AB3-E0A65B39F5E1}">
+  <ds:schemaRefs>
+    <ds:schemaRef ds:uri="http://schemas.microsoft.com/office/infopath/2007/PartnerControls"/>
+    <ds:schemaRef ds:uri="http://purl.org/dc/elements/1.1/"/>
+    <ds:schemaRef ds:uri="http://schemas.microsoft.com/office/2006/metadata/properties"/>
+    <ds:schemaRef ds:uri="http://purl.org/dc/terms/"/>
+    <ds:schemaRef ds:uri="http://schemas.openxmlformats.org/package/2006/metadata/core-properties"/>
+    <ds:schemaRef ds:uri="http://schemas.microsoft.com/office/2006/documentManagement/types"/>
+    <ds:schemaRef ds:uri="http://purl.org/dc/dcmitype/"/>
+    <ds:schemaRef ds:uri="16c05727-aa75-4e4a-9b5f-8a80a1165891"/>
+    <ds:schemaRef ds:uri="71af3243-3dd4-4a8d-8c0d-dd76da1f02a5"/>
+    <ds:schemaRef ds:uri="http://www.w3.org/XML/1998/namespace"/>
+  </ds:schemaRefs>
+</ds:datastoreItem>
 </file>
</xml_diff>